<commit_message>
updates for workshop this week
</commit_message>
<xml_diff>
--- a/Workshop_Materials/Workshop_9-Working_with_Text_Data.pptx
+++ b/Workshop_Materials/Workshop_9-Working_with_Text_Data.pptx
@@ -209,7 +209,7 @@
           <a:p>
             <a:fld id="{88D402AD-7ADB-D541-A58A-382EB9179170}" type="datetimeFigureOut">
               <a:rPr lang="en-US" smtClean="0"/>
-              <a:t>10/24/17</a:t>
+              <a:t>11/8/17</a:t>
             </a:fld>
             <a:endParaRPr lang="en-US"/>
           </a:p>
@@ -742,7 +742,7 @@
           <a:p>
             <a:fld id="{AF5CBEF6-4E17-CF46-AF64-B072BA4F854A}" type="datetimeFigureOut">
               <a:rPr lang="en-US" smtClean="0"/>
-              <a:t>10/24/17</a:t>
+              <a:t>11/8/17</a:t>
             </a:fld>
             <a:endParaRPr lang="en-US"/>
           </a:p>
@@ -912,7 +912,7 @@
           <a:p>
             <a:fld id="{AF5CBEF6-4E17-CF46-AF64-B072BA4F854A}" type="datetimeFigureOut">
               <a:rPr lang="en-US" smtClean="0"/>
-              <a:t>10/24/17</a:t>
+              <a:t>11/8/17</a:t>
             </a:fld>
             <a:endParaRPr lang="en-US"/>
           </a:p>
@@ -1158,7 +1158,7 @@
           <a:p>
             <a:fld id="{AF5CBEF6-4E17-CF46-AF64-B072BA4F854A}" type="datetimeFigureOut">
               <a:rPr lang="en-US" smtClean="0"/>
-              <a:t>10/24/17</a:t>
+              <a:t>11/8/17</a:t>
             </a:fld>
             <a:endParaRPr lang="en-US"/>
           </a:p>
@@ -1446,7 +1446,7 @@
           <a:p>
             <a:fld id="{AF5CBEF6-4E17-CF46-AF64-B072BA4F854A}" type="datetimeFigureOut">
               <a:rPr lang="en-US" smtClean="0"/>
-              <a:t>10/24/17</a:t>
+              <a:t>11/8/17</a:t>
             </a:fld>
             <a:endParaRPr lang="en-US"/>
           </a:p>
@@ -1868,7 +1868,7 @@
           <a:p>
             <a:fld id="{AF5CBEF6-4E17-CF46-AF64-B072BA4F854A}" type="datetimeFigureOut">
               <a:rPr lang="en-US" smtClean="0"/>
-              <a:t>10/24/17</a:t>
+              <a:t>11/8/17</a:t>
             </a:fld>
             <a:endParaRPr lang="en-US"/>
           </a:p>
@@ -1986,7 +1986,7 @@
           <a:p>
             <a:fld id="{AF5CBEF6-4E17-CF46-AF64-B072BA4F854A}" type="datetimeFigureOut">
               <a:rPr lang="en-US" smtClean="0"/>
-              <a:t>10/24/17</a:t>
+              <a:t>11/8/17</a:t>
             </a:fld>
             <a:endParaRPr lang="en-US"/>
           </a:p>
@@ -2081,7 +2081,7 @@
           <a:p>
             <a:fld id="{AF5CBEF6-4E17-CF46-AF64-B072BA4F854A}" type="datetimeFigureOut">
               <a:rPr lang="en-US" smtClean="0"/>
-              <a:t>10/24/17</a:t>
+              <a:t>11/8/17</a:t>
             </a:fld>
             <a:endParaRPr lang="en-US"/>
           </a:p>
@@ -2334,7 +2334,7 @@
           <a:p>
             <a:fld id="{AF5CBEF6-4E17-CF46-AF64-B072BA4F854A}" type="datetimeFigureOut">
               <a:rPr lang="en-US" smtClean="0"/>
-              <a:t>10/24/17</a:t>
+              <a:t>11/8/17</a:t>
             </a:fld>
             <a:endParaRPr lang="en-US"/>
           </a:p>
@@ -2547,7 +2547,7 @@
           <a:p>
             <a:fld id="{AF5CBEF6-4E17-CF46-AF64-B072BA4F854A}" type="datetimeFigureOut">
               <a:rPr lang="en-US" smtClean="0"/>
-              <a:t>10/24/17</a:t>
+              <a:t>11/8/17</a:t>
             </a:fld>
             <a:endParaRPr lang="en-US"/>
           </a:p>
@@ -2943,7 +2943,7 @@
           <a:p>
             <a:r>
               <a:rPr lang="en-US" sz="4000" dirty="0" smtClean="0"/>
-              <a:t>Functions</a:t>
+              <a:t>Working with Text Data</a:t>
             </a:r>
             <a:endParaRPr lang="en-US" sz="4000" dirty="0"/>
           </a:p>
@@ -2967,7 +2967,7 @@
         </p:spPr>
         <p:txBody>
           <a:bodyPr>
-            <a:normAutofit/>
+            <a:normAutofit lnSpcReduction="10000"/>
           </a:bodyPr>
           <a:lstStyle/>
           <a:p>
@@ -2980,7 +2980,7 @@
                   <a:srgbClr val="999999"/>
                 </a:solidFill>
               </a:rPr>
-              <a:t>Reusing Code.</a:t>
+              <a:t>Manipulating strings.</a:t>
             </a:r>
             <a:endParaRPr lang="en-US" sz="2800" dirty="0" smtClean="0">
               <a:solidFill>
@@ -2998,7 +2998,7 @@
                   <a:srgbClr val="999999"/>
                 </a:solidFill>
               </a:rPr>
-              <a:t>Generalization.</a:t>
+              <a:t>Extracting bits of text.</a:t>
             </a:r>
             <a:endParaRPr lang="en-US" sz="2800" dirty="0" smtClean="0">
               <a:solidFill>
@@ -3016,20 +3016,33 @@
                   <a:srgbClr val="999999"/>
                 </a:solidFill>
               </a:rPr>
-              <a:t>Breaking up Functionality.</a:t>
-            </a:r>
+              <a:t>Basic text cleaning, tokenization.</a:t>
+            </a:r>
+            <a:endParaRPr lang="en-US" sz="2800" dirty="0" smtClean="0">
+              <a:solidFill>
+                <a:srgbClr val="999999"/>
+              </a:solidFill>
+            </a:endParaRPr>
           </a:p>
           <a:p>
             <a:pPr marL="514350" indent="-514350" algn="l">
               <a:buAutoNum type="arabicPeriod"/>
             </a:pPr>
+            <a:r>
+              <a:rPr lang="en-US" sz="2800" smtClean="0">
+                <a:solidFill>
+                  <a:srgbClr val="999999"/>
+                </a:solidFill>
+              </a:rPr>
+              <a:t>Document-term </a:t>
+            </a:r>
             <a:r>
               <a:rPr lang="en-US" sz="2800" dirty="0" smtClean="0">
                 <a:solidFill>
                   <a:srgbClr val="999999"/>
                 </a:solidFill>
               </a:rPr>
-              <a:t>Precursor to </a:t>
+              <a:t>matrices and what to </a:t>
             </a:r>
             <a:r>
               <a:rPr lang="en-US" sz="2800" smtClean="0">
@@ -3037,7 +3050,7 @@
                   <a:srgbClr val="999999"/>
                 </a:solidFill>
               </a:rPr>
-              <a:t>R package.</a:t>
+              <a:t>do with them.</a:t>
             </a:r>
             <a:endParaRPr lang="en-US" sz="2800" dirty="0" smtClean="0">
               <a:solidFill>

</xml_diff>